<commit_message>
Added figs 5 and 6
</commit_message>
<xml_diff>
--- a/FullPlots/MMMFigures.pptx
+++ b/FullPlots/MMMFigures.pptx
@@ -270,7 +270,7 @@
           <a:p>
             <a:fld id="{F387635C-7373-4F1A-9C04-9755FFB3E406}" type="datetimeFigureOut">
               <a:rPr lang="en-US" smtClean="0"/>
-              <a:t>10/31/2020</a:t>
+              <a:t>11/1/2020</a:t>
             </a:fld>
             <a:endParaRPr lang="en-US"/>
           </a:p>
@@ -468,7 +468,7 @@
           <a:p>
             <a:fld id="{F387635C-7373-4F1A-9C04-9755FFB3E406}" type="datetimeFigureOut">
               <a:rPr lang="en-US" smtClean="0"/>
-              <a:t>10/31/2020</a:t>
+              <a:t>11/1/2020</a:t>
             </a:fld>
             <a:endParaRPr lang="en-US"/>
           </a:p>
@@ -676,7 +676,7 @@
           <a:p>
             <a:fld id="{F387635C-7373-4F1A-9C04-9755FFB3E406}" type="datetimeFigureOut">
               <a:rPr lang="en-US" smtClean="0"/>
-              <a:t>10/31/2020</a:t>
+              <a:t>11/1/2020</a:t>
             </a:fld>
             <a:endParaRPr lang="en-US"/>
           </a:p>
@@ -874,7 +874,7 @@
           <a:p>
             <a:fld id="{F387635C-7373-4F1A-9C04-9755FFB3E406}" type="datetimeFigureOut">
               <a:rPr lang="en-US" smtClean="0"/>
-              <a:t>10/31/2020</a:t>
+              <a:t>11/1/2020</a:t>
             </a:fld>
             <a:endParaRPr lang="en-US"/>
           </a:p>
@@ -1149,7 +1149,7 @@
           <a:p>
             <a:fld id="{F387635C-7373-4F1A-9C04-9755FFB3E406}" type="datetimeFigureOut">
               <a:rPr lang="en-US" smtClean="0"/>
-              <a:t>10/31/2020</a:t>
+              <a:t>11/1/2020</a:t>
             </a:fld>
             <a:endParaRPr lang="en-US"/>
           </a:p>
@@ -1414,7 +1414,7 @@
           <a:p>
             <a:fld id="{F387635C-7373-4F1A-9C04-9755FFB3E406}" type="datetimeFigureOut">
               <a:rPr lang="en-US" smtClean="0"/>
-              <a:t>10/31/2020</a:t>
+              <a:t>11/1/2020</a:t>
             </a:fld>
             <a:endParaRPr lang="en-US"/>
           </a:p>
@@ -1826,7 +1826,7 @@
           <a:p>
             <a:fld id="{F387635C-7373-4F1A-9C04-9755FFB3E406}" type="datetimeFigureOut">
               <a:rPr lang="en-US" smtClean="0"/>
-              <a:t>10/31/2020</a:t>
+              <a:t>11/1/2020</a:t>
             </a:fld>
             <a:endParaRPr lang="en-US"/>
           </a:p>
@@ -1967,7 +1967,7 @@
           <a:p>
             <a:fld id="{F387635C-7373-4F1A-9C04-9755FFB3E406}" type="datetimeFigureOut">
               <a:rPr lang="en-US" smtClean="0"/>
-              <a:t>10/31/2020</a:t>
+              <a:t>11/1/2020</a:t>
             </a:fld>
             <a:endParaRPr lang="en-US"/>
           </a:p>
@@ -2080,7 +2080,7 @@
           <a:p>
             <a:fld id="{F387635C-7373-4F1A-9C04-9755FFB3E406}" type="datetimeFigureOut">
               <a:rPr lang="en-US" smtClean="0"/>
-              <a:t>10/31/2020</a:t>
+              <a:t>11/1/2020</a:t>
             </a:fld>
             <a:endParaRPr lang="en-US"/>
           </a:p>
@@ -2391,7 +2391,7 @@
           <a:p>
             <a:fld id="{F387635C-7373-4F1A-9C04-9755FFB3E406}" type="datetimeFigureOut">
               <a:rPr lang="en-US" smtClean="0"/>
-              <a:t>10/31/2020</a:t>
+              <a:t>11/1/2020</a:t>
             </a:fld>
             <a:endParaRPr lang="en-US"/>
           </a:p>
@@ -2679,7 +2679,7 @@
           <a:p>
             <a:fld id="{F387635C-7373-4F1A-9C04-9755FFB3E406}" type="datetimeFigureOut">
               <a:rPr lang="en-US" smtClean="0"/>
-              <a:t>10/31/2020</a:t>
+              <a:t>11/1/2020</a:t>
             </a:fld>
             <a:endParaRPr lang="en-US"/>
           </a:p>
@@ -2920,7 +2920,7 @@
           <a:p>
             <a:fld id="{F387635C-7373-4F1A-9C04-9755FFB3E406}" type="datetimeFigureOut">
               <a:rPr lang="en-US" smtClean="0"/>
-              <a:t>10/31/2020</a:t>
+              <a:t>11/1/2020</a:t>
             </a:fld>
             <a:endParaRPr lang="en-US"/>
           </a:p>
@@ -3339,10 +3339,10 @@
       </p:grpSpPr>
       <p:grpSp>
         <p:nvGrpSpPr>
-          <p:cNvPr id="12" name="Group 11">
-            <a:extLst>
-              <a:ext uri="{FF2B5EF4-FFF2-40B4-BE49-F238E27FC236}">
-                <a16:creationId xmlns:a16="http://schemas.microsoft.com/office/drawing/2014/main" id="{5E10F818-DEED-45CB-8A0B-43AD3F329577}"/>
+          <p:cNvPr id="3" name="Group 2">
+            <a:extLst>
+              <a:ext uri="{FF2B5EF4-FFF2-40B4-BE49-F238E27FC236}">
+                <a16:creationId xmlns:a16="http://schemas.microsoft.com/office/drawing/2014/main" id="{5C292823-F748-4A37-9CD6-07458B6D8717}"/>
               </a:ext>
             </a:extLst>
           </p:cNvPr>
@@ -3351,15 +3351,15 @@
         </p:nvGrpSpPr>
         <p:grpSpPr>
           <a:xfrm>
-            <a:off x="1" y="0"/>
-            <a:ext cx="11109963" cy="3429001"/>
-            <a:chOff x="1" y="0"/>
-            <a:chExt cx="11109963" cy="3429001"/>
+            <a:off x="0" y="-256265"/>
+            <a:ext cx="11109962" cy="3429000"/>
+            <a:chOff x="0" y="0"/>
+            <a:chExt cx="11109962" cy="3429000"/>
           </a:xfrm>
         </p:grpSpPr>
         <p:pic>
           <p:nvPicPr>
-            <p:cNvPr id="5" name="Picture 4" descr="Chart, bar chart&#10;&#10;Description automatically generated">
+            <p:cNvPr id="5" name="Picture 4">
               <a:extLst>
                 <a:ext uri="{FF2B5EF4-FFF2-40B4-BE49-F238E27FC236}">
                   <a16:creationId xmlns:a16="http://schemas.microsoft.com/office/drawing/2014/main" id="{D1DDFD1D-BE7D-46A7-80F5-3A054C6ECB63}"/>
@@ -3379,14 +3379,13 @@
                 </a:ext>
               </a:extLst>
             </a:blip>
-            <a:stretch>
-              <a:fillRect/>
-            </a:stretch>
+            <a:srcRect/>
+            <a:stretch/>
           </p:blipFill>
           <p:spPr>
             <a:xfrm>
-              <a:off x="1" y="0"/>
-              <a:ext cx="5554982" cy="3429001"/>
+              <a:off x="0" y="0"/>
+              <a:ext cx="5554982" cy="3429000"/>
             </a:xfrm>
             <a:prstGeom prst="rect">
               <a:avLst/>
@@ -3395,7 +3394,7 @@
         </p:pic>
         <p:pic>
           <p:nvPicPr>
-            <p:cNvPr id="9" name="Picture 8" descr="Chart, treemap chart&#10;&#10;Description automatically generated">
+            <p:cNvPr id="9" name="Picture 8">
               <a:extLst>
                 <a:ext uri="{FF2B5EF4-FFF2-40B4-BE49-F238E27FC236}">
                   <a16:creationId xmlns:a16="http://schemas.microsoft.com/office/drawing/2014/main" id="{B0F15A1B-56DB-4FA9-88F7-2498DE68E7F4}"/>
@@ -3415,14 +3414,13 @@
                 </a:ext>
               </a:extLst>
             </a:blip>
-            <a:stretch>
-              <a:fillRect/>
-            </a:stretch>
+            <a:srcRect/>
+            <a:stretch/>
           </p:blipFill>
           <p:spPr>
             <a:xfrm>
-              <a:off x="5554983" y="0"/>
-              <a:ext cx="5554981" cy="3429000"/>
+              <a:off x="5554982" y="0"/>
+              <a:ext cx="5554980" cy="3429000"/>
             </a:xfrm>
             <a:prstGeom prst="rect">
               <a:avLst/>
@@ -3431,10 +3429,10 @@
         </p:pic>
         <p:pic>
           <p:nvPicPr>
-            <p:cNvPr id="11" name="Picture 10" descr="Chart, bar chart&#10;&#10;Description automatically generated">
+            <p:cNvPr id="2" name="Picture 1">
               <a:extLst>
                 <a:ext uri="{FF2B5EF4-FFF2-40B4-BE49-F238E27FC236}">
-                  <a16:creationId xmlns:a16="http://schemas.microsoft.com/office/drawing/2014/main" id="{797BE86F-31D0-46EB-862A-DEA33A795E1D}"/>
+                  <a16:creationId xmlns:a16="http://schemas.microsoft.com/office/drawing/2014/main" id="{2ADD6474-6B6C-4BAA-8ECD-75F9E79BF5A4}"/>
                 </a:ext>
               </a:extLst>
             </p:cNvPr>
@@ -3451,13 +3449,13 @@
                 </a:ext>
               </a:extLst>
             </a:blip>
-            <a:srcRect l="67167" t="30834"/>
+            <a:srcRect l="67189" t="29356"/>
             <a:stretch/>
           </p:blipFill>
           <p:spPr>
             <a:xfrm>
-              <a:off x="3747068" y="528649"/>
-              <a:ext cx="1823872" cy="2371702"/>
+              <a:off x="3637937" y="345048"/>
+              <a:ext cx="1822638" cy="2422382"/>
             </a:xfrm>
             <a:prstGeom prst="rect">
               <a:avLst/>
@@ -3491,7 +3489,7 @@
           </p:blipFill>
           <p:spPr>
             <a:xfrm>
-              <a:off x="3747068" y="1859369"/>
+              <a:off x="3637937" y="1747052"/>
               <a:ext cx="1807915" cy="1141030"/>
             </a:xfrm>
             <a:prstGeom prst="rect">
@@ -3499,6 +3497,146 @@
             </a:prstGeom>
           </p:spPr>
         </p:pic>
+      </p:grpSp>
+      <p:grpSp>
+        <p:nvGrpSpPr>
+          <p:cNvPr id="12" name="Group 11">
+            <a:extLst>
+              <a:ext uri="{FF2B5EF4-FFF2-40B4-BE49-F238E27FC236}">
+                <a16:creationId xmlns:a16="http://schemas.microsoft.com/office/drawing/2014/main" id="{BC2A56AC-500D-4938-8BFA-F923C272884C}"/>
+              </a:ext>
+            </a:extLst>
+          </p:cNvPr>
+          <p:cNvGrpSpPr/>
+          <p:nvPr/>
+        </p:nvGrpSpPr>
+        <p:grpSpPr>
+          <a:xfrm>
+            <a:off x="2331117" y="3341513"/>
+            <a:ext cx="5645678" cy="3484985"/>
+            <a:chOff x="2331117" y="3341513"/>
+            <a:chExt cx="5645678" cy="3484985"/>
+          </a:xfrm>
+        </p:grpSpPr>
+        <p:pic>
+          <p:nvPicPr>
+            <p:cNvPr id="8" name="Picture 7">
+              <a:extLst>
+                <a:ext uri="{FF2B5EF4-FFF2-40B4-BE49-F238E27FC236}">
+                  <a16:creationId xmlns:a16="http://schemas.microsoft.com/office/drawing/2014/main" id="{4533F325-6C53-46DF-9322-146007C67278}"/>
+                </a:ext>
+              </a:extLst>
+            </p:cNvPr>
+            <p:cNvPicPr>
+              <a:picLocks noChangeAspect="1"/>
+            </p:cNvPicPr>
+            <p:nvPr/>
+          </p:nvPicPr>
+          <p:blipFill>
+            <a:blip r:embed="rId5">
+              <a:extLst>
+                <a:ext uri="{28A0092B-C50C-407E-A947-70E740481C1C}">
+                  <a14:useLocalDpi xmlns:a14="http://schemas.microsoft.com/office/drawing/2010/main" val="0"/>
+                </a:ext>
+              </a:extLst>
+            </a:blip>
+            <a:srcRect/>
+            <a:stretch/>
+          </p:blipFill>
+          <p:spPr>
+            <a:xfrm>
+              <a:off x="2331117" y="3341513"/>
+              <a:ext cx="5645678" cy="3484985"/>
+            </a:xfrm>
+            <a:prstGeom prst="rect">
+              <a:avLst/>
+            </a:prstGeom>
+          </p:spPr>
+        </p:pic>
+        <p:sp>
+          <p:nvSpPr>
+            <p:cNvPr id="10" name="Isosceles Triangle 9">
+              <a:extLst>
+                <a:ext uri="{FF2B5EF4-FFF2-40B4-BE49-F238E27FC236}">
+                  <a16:creationId xmlns:a16="http://schemas.microsoft.com/office/drawing/2014/main" id="{58B992D0-3FAE-489C-80E2-DF97DD1C8664}"/>
+                </a:ext>
+              </a:extLst>
+            </p:cNvPr>
+            <p:cNvSpPr/>
+            <p:nvPr/>
+          </p:nvSpPr>
+          <p:spPr>
+            <a:xfrm>
+              <a:off x="3600284" y="6196403"/>
+              <a:ext cx="112956" cy="107576"/>
+            </a:xfrm>
+            <a:prstGeom prst="triangle">
+              <a:avLst/>
+            </a:prstGeom>
+          </p:spPr>
+          <p:style>
+            <a:lnRef idx="2">
+              <a:schemeClr val="dk1">
+                <a:shade val="50000"/>
+              </a:schemeClr>
+            </a:lnRef>
+            <a:fillRef idx="1">
+              <a:schemeClr val="dk1"/>
+            </a:fillRef>
+            <a:effectRef idx="0">
+              <a:schemeClr val="dk1"/>
+            </a:effectRef>
+            <a:fontRef idx="minor">
+              <a:schemeClr val="lt1"/>
+            </a:fontRef>
+          </p:style>
+          <p:txBody>
+            <a:bodyPr rtlCol="0" anchor="ctr"/>
+            <a:lstStyle/>
+            <a:p>
+              <a:pPr algn="ctr"/>
+              <a:endParaRPr lang="en-US"/>
+            </a:p>
+          </p:txBody>
+        </p:sp>
+        <p:sp>
+          <p:nvSpPr>
+            <p:cNvPr id="11" name="TextBox 10">
+              <a:extLst>
+                <a:ext uri="{FF2B5EF4-FFF2-40B4-BE49-F238E27FC236}">
+                  <a16:creationId xmlns:a16="http://schemas.microsoft.com/office/drawing/2014/main" id="{7C908048-AD1F-47C3-BE15-7EA86282ACB3}"/>
+                </a:ext>
+              </a:extLst>
+            </p:cNvPr>
+            <p:cNvSpPr txBox="1"/>
+            <p:nvPr/>
+          </p:nvSpPr>
+          <p:spPr>
+            <a:xfrm>
+              <a:off x="3270322" y="6250191"/>
+              <a:ext cx="2748579" cy="246221"/>
+            </a:xfrm>
+            <a:prstGeom prst="rect">
+              <a:avLst/>
+            </a:prstGeom>
+            <a:noFill/>
+          </p:spPr>
+          <p:txBody>
+            <a:bodyPr wrap="square" rtlCol="0">
+              <a:spAutoFit/>
+            </a:bodyPr>
+            <a:lstStyle/>
+            <a:p>
+              <a:r>
+                <a:rPr lang="en-US" sz="1000" dirty="0">
+                  <a:latin typeface="Arial" panose="020B0604020202020204" pitchFamily="34" charset="0"/>
+                  <a:cs typeface="Arial" panose="020B0604020202020204" pitchFamily="34" charset="0"/>
+                </a:rPr>
+                <a:t>Bracket Drop</a:t>
+              </a:r>
+            </a:p>
+          </p:txBody>
+        </p:sp>
       </p:grpSp>
     </p:spTree>
     <p:extLst>

</xml_diff>

<commit_message>
New versions of libguide figure and engagement fig with xaxis tuned to tournament start or two axes
</commit_message>
<xml_diff>
--- a/FullPlots/MMMFigures.pptx
+++ b/FullPlots/MMMFigures.pptx
@@ -6,6 +6,8 @@
   </p:sldMasterIdLst>
   <p:sldIdLst>
     <p:sldId id="256" r:id="rId2"/>
+    <p:sldId id="258" r:id="rId3"/>
+    <p:sldId id="257" r:id="rId4"/>
   </p:sldIdLst>
   <p:sldSz cx="12192000" cy="6858000"/>
   <p:notesSz cx="6858000" cy="9144000"/>
@@ -3651,6 +3653,763 @@
 </p:sld>
 </file>
 
+<file path=ppt/slides/slide2.xml><?xml version="1.0" encoding="utf-8"?>
+<p:sld xmlns:a="http://schemas.openxmlformats.org/drawingml/2006/main" xmlns:r="http://schemas.openxmlformats.org/officeDocument/2006/relationships" xmlns:p="http://schemas.openxmlformats.org/presentationml/2006/main">
+  <p:cSld>
+    <p:spTree>
+      <p:nvGrpSpPr>
+        <p:cNvPr id="1" name=""/>
+        <p:cNvGrpSpPr/>
+        <p:nvPr/>
+      </p:nvGrpSpPr>
+      <p:grpSpPr>
+        <a:xfrm>
+          <a:off x="0" y="0"/>
+          <a:ext cx="0" cy="0"/>
+          <a:chOff x="0" y="0"/>
+          <a:chExt cx="0" cy="0"/>
+        </a:xfrm>
+      </p:grpSpPr>
+      <p:grpSp>
+        <p:nvGrpSpPr>
+          <p:cNvPr id="12" name="Group 11">
+            <a:extLst>
+              <a:ext uri="{FF2B5EF4-FFF2-40B4-BE49-F238E27FC236}">
+                <a16:creationId xmlns:a16="http://schemas.microsoft.com/office/drawing/2014/main" id="{BC2A56AC-500D-4938-8BFA-F923C272884C}"/>
+              </a:ext>
+            </a:extLst>
+          </p:cNvPr>
+          <p:cNvGrpSpPr/>
+          <p:nvPr/>
+        </p:nvGrpSpPr>
+        <p:grpSpPr>
+          <a:xfrm>
+            <a:off x="2331118" y="3341513"/>
+            <a:ext cx="5645676" cy="3484985"/>
+            <a:chOff x="2331118" y="3341513"/>
+            <a:chExt cx="5645676" cy="3484985"/>
+          </a:xfrm>
+        </p:grpSpPr>
+        <p:pic>
+          <p:nvPicPr>
+            <p:cNvPr id="8" name="Picture 7">
+              <a:extLst>
+                <a:ext uri="{FF2B5EF4-FFF2-40B4-BE49-F238E27FC236}">
+                  <a16:creationId xmlns:a16="http://schemas.microsoft.com/office/drawing/2014/main" id="{4533F325-6C53-46DF-9322-146007C67278}"/>
+                </a:ext>
+              </a:extLst>
+            </p:cNvPr>
+            <p:cNvPicPr>
+              <a:picLocks noChangeAspect="1"/>
+            </p:cNvPicPr>
+            <p:nvPr/>
+          </p:nvPicPr>
+          <p:blipFill>
+            <a:blip r:embed="rId2">
+              <a:extLst>
+                <a:ext uri="{28A0092B-C50C-407E-A947-70E740481C1C}">
+                  <a14:useLocalDpi xmlns:a14="http://schemas.microsoft.com/office/drawing/2010/main" val="0"/>
+                </a:ext>
+              </a:extLst>
+            </a:blip>
+            <a:srcRect/>
+            <a:stretch/>
+          </p:blipFill>
+          <p:spPr>
+            <a:xfrm>
+              <a:off x="2331118" y="3341513"/>
+              <a:ext cx="5645676" cy="3484985"/>
+            </a:xfrm>
+            <a:prstGeom prst="rect">
+              <a:avLst/>
+            </a:prstGeom>
+          </p:spPr>
+        </p:pic>
+        <p:sp>
+          <p:nvSpPr>
+            <p:cNvPr id="10" name="Isosceles Triangle 9">
+              <a:extLst>
+                <a:ext uri="{FF2B5EF4-FFF2-40B4-BE49-F238E27FC236}">
+                  <a16:creationId xmlns:a16="http://schemas.microsoft.com/office/drawing/2014/main" id="{58B992D0-3FAE-489C-80E2-DF97DD1C8664}"/>
+                </a:ext>
+              </a:extLst>
+            </p:cNvPr>
+            <p:cNvSpPr/>
+            <p:nvPr/>
+          </p:nvSpPr>
+          <p:spPr>
+            <a:xfrm>
+              <a:off x="3571884" y="6196403"/>
+              <a:ext cx="112956" cy="107576"/>
+            </a:xfrm>
+            <a:prstGeom prst="triangle">
+              <a:avLst/>
+            </a:prstGeom>
+          </p:spPr>
+          <p:style>
+            <a:lnRef idx="2">
+              <a:schemeClr val="dk1">
+                <a:shade val="50000"/>
+              </a:schemeClr>
+            </a:lnRef>
+            <a:fillRef idx="1">
+              <a:schemeClr val="dk1"/>
+            </a:fillRef>
+            <a:effectRef idx="0">
+              <a:schemeClr val="dk1"/>
+            </a:effectRef>
+            <a:fontRef idx="minor">
+              <a:schemeClr val="lt1"/>
+            </a:fontRef>
+          </p:style>
+          <p:txBody>
+            <a:bodyPr rtlCol="0" anchor="ctr"/>
+            <a:lstStyle/>
+            <a:p>
+              <a:pPr algn="ctr"/>
+              <a:endParaRPr lang="en-US"/>
+            </a:p>
+          </p:txBody>
+        </p:sp>
+        <p:sp>
+          <p:nvSpPr>
+            <p:cNvPr id="11" name="TextBox 10">
+              <a:extLst>
+                <a:ext uri="{FF2B5EF4-FFF2-40B4-BE49-F238E27FC236}">
+                  <a16:creationId xmlns:a16="http://schemas.microsoft.com/office/drawing/2014/main" id="{7C908048-AD1F-47C3-BE15-7EA86282ACB3}"/>
+                </a:ext>
+              </a:extLst>
+            </p:cNvPr>
+            <p:cNvSpPr txBox="1"/>
+            <p:nvPr/>
+          </p:nvSpPr>
+          <p:spPr>
+            <a:xfrm>
+              <a:off x="3241922" y="6250191"/>
+              <a:ext cx="1017703" cy="246221"/>
+            </a:xfrm>
+            <a:prstGeom prst="rect">
+              <a:avLst/>
+            </a:prstGeom>
+            <a:noFill/>
+          </p:spPr>
+          <p:txBody>
+            <a:bodyPr wrap="square" rtlCol="0">
+              <a:spAutoFit/>
+            </a:bodyPr>
+            <a:lstStyle/>
+            <a:p>
+              <a:r>
+                <a:rPr lang="en-US" sz="1000" dirty="0">
+                  <a:latin typeface="Arial" panose="020B0604020202020204" pitchFamily="34" charset="0"/>
+                  <a:cs typeface="Arial" panose="020B0604020202020204" pitchFamily="34" charset="0"/>
+                </a:rPr>
+                <a:t>Bracket Drop</a:t>
+              </a:r>
+            </a:p>
+          </p:txBody>
+        </p:sp>
+      </p:grpSp>
+    </p:spTree>
+    <p:extLst>
+      <p:ext uri="{BB962C8B-B14F-4D97-AF65-F5344CB8AC3E}">
+        <p14:creationId xmlns:p14="http://schemas.microsoft.com/office/powerpoint/2010/main" val="1815568578"/>
+      </p:ext>
+    </p:extLst>
+  </p:cSld>
+  <p:clrMapOvr>
+    <a:masterClrMapping/>
+  </p:clrMapOvr>
+</p:sld>
+</file>
+
+<file path=ppt/slides/slide3.xml><?xml version="1.0" encoding="utf-8"?>
+<p:sld xmlns:a="http://schemas.openxmlformats.org/drawingml/2006/main" xmlns:r="http://schemas.openxmlformats.org/officeDocument/2006/relationships" xmlns:p="http://schemas.openxmlformats.org/presentationml/2006/main">
+  <p:cSld>
+    <p:spTree>
+      <p:nvGrpSpPr>
+        <p:cNvPr id="1" name=""/>
+        <p:cNvGrpSpPr/>
+        <p:nvPr/>
+      </p:nvGrpSpPr>
+      <p:grpSpPr>
+        <a:xfrm>
+          <a:off x="0" y="0"/>
+          <a:ext cx="0" cy="0"/>
+          <a:chOff x="0" y="0"/>
+          <a:chExt cx="0" cy="0"/>
+        </a:xfrm>
+      </p:grpSpPr>
+      <p:grpSp>
+        <p:nvGrpSpPr>
+          <p:cNvPr id="22" name="Group 21">
+            <a:extLst>
+              <a:ext uri="{FF2B5EF4-FFF2-40B4-BE49-F238E27FC236}">
+                <a16:creationId xmlns:a16="http://schemas.microsoft.com/office/drawing/2014/main" id="{25D490DC-2AA1-4B3A-BEF0-7EDCCC4C08AC}"/>
+              </a:ext>
+            </a:extLst>
+          </p:cNvPr>
+          <p:cNvGrpSpPr/>
+          <p:nvPr/>
+        </p:nvGrpSpPr>
+        <p:grpSpPr>
+          <a:xfrm>
+            <a:off x="609589" y="1142995"/>
+            <a:ext cx="11224734" cy="4572009"/>
+            <a:chOff x="609589" y="1142995"/>
+            <a:chExt cx="11224734" cy="4572009"/>
+          </a:xfrm>
+        </p:grpSpPr>
+        <p:sp>
+          <p:nvSpPr>
+            <p:cNvPr id="21" name="Rectangle 20">
+              <a:extLst>
+                <a:ext uri="{FF2B5EF4-FFF2-40B4-BE49-F238E27FC236}">
+                  <a16:creationId xmlns:a16="http://schemas.microsoft.com/office/drawing/2014/main" id="{8861E9D6-92E5-4FE1-9307-C3A53185A806}"/>
+                </a:ext>
+              </a:extLst>
+            </p:cNvPr>
+            <p:cNvSpPr/>
+            <p:nvPr/>
+          </p:nvSpPr>
+          <p:spPr>
+            <a:xfrm rot="5400000">
+              <a:off x="9349813" y="3213338"/>
+              <a:ext cx="4554852" cy="414169"/>
+            </a:xfrm>
+            <a:prstGeom prst="rect">
+              <a:avLst/>
+            </a:prstGeom>
+            <a:solidFill>
+              <a:schemeClr val="bg1"/>
+            </a:solidFill>
+            <a:ln>
+              <a:solidFill>
+                <a:schemeClr val="bg1"/>
+              </a:solidFill>
+            </a:ln>
+          </p:spPr>
+          <p:style>
+            <a:lnRef idx="2">
+              <a:schemeClr val="accent1">
+                <a:shade val="50000"/>
+              </a:schemeClr>
+            </a:lnRef>
+            <a:fillRef idx="1">
+              <a:schemeClr val="accent1"/>
+            </a:fillRef>
+            <a:effectRef idx="0">
+              <a:schemeClr val="accent1"/>
+            </a:effectRef>
+            <a:fontRef idx="minor">
+              <a:schemeClr val="lt1"/>
+            </a:fontRef>
+          </p:style>
+          <p:txBody>
+            <a:bodyPr rtlCol="0" anchor="ctr"/>
+            <a:lstStyle/>
+            <a:p>
+              <a:pPr algn="ctr"/>
+              <a:endParaRPr lang="en-US"/>
+            </a:p>
+          </p:txBody>
+        </p:sp>
+        <p:grpSp>
+          <p:nvGrpSpPr>
+            <p:cNvPr id="20" name="Group 19">
+              <a:extLst>
+                <a:ext uri="{FF2B5EF4-FFF2-40B4-BE49-F238E27FC236}">
+                  <a16:creationId xmlns:a16="http://schemas.microsoft.com/office/drawing/2014/main" id="{F1AB31D4-E801-4AB6-81C0-BDBA569B284D}"/>
+                </a:ext>
+              </a:extLst>
+            </p:cNvPr>
+            <p:cNvGrpSpPr/>
+            <p:nvPr/>
+          </p:nvGrpSpPr>
+          <p:grpSpPr>
+            <a:xfrm>
+              <a:off x="609589" y="1142995"/>
+              <a:ext cx="11160165" cy="4572009"/>
+              <a:chOff x="609589" y="1142995"/>
+              <a:chExt cx="11160165" cy="4572009"/>
+            </a:xfrm>
+          </p:grpSpPr>
+          <p:grpSp>
+            <p:nvGrpSpPr>
+              <p:cNvPr id="16" name="Group 15">
+                <a:extLst>
+                  <a:ext uri="{FF2B5EF4-FFF2-40B4-BE49-F238E27FC236}">
+                    <a16:creationId xmlns:a16="http://schemas.microsoft.com/office/drawing/2014/main" id="{D9F1730E-9FBE-4BE8-8E08-AB062CFCE7D8}"/>
+                  </a:ext>
+                </a:extLst>
+              </p:cNvPr>
+              <p:cNvGrpSpPr/>
+              <p:nvPr/>
+            </p:nvGrpSpPr>
+            <p:grpSpPr>
+              <a:xfrm>
+                <a:off x="609589" y="1142995"/>
+                <a:ext cx="11160165" cy="4572009"/>
+                <a:chOff x="609589" y="1142995"/>
+                <a:chExt cx="11160165" cy="4572009"/>
+              </a:xfrm>
+            </p:grpSpPr>
+            <p:pic>
+              <p:nvPicPr>
+                <p:cNvPr id="5" name="Picture 4">
+                  <a:extLst>
+                    <a:ext uri="{FF2B5EF4-FFF2-40B4-BE49-F238E27FC236}">
+                      <a16:creationId xmlns:a16="http://schemas.microsoft.com/office/drawing/2014/main" id="{7608456D-8CD5-496D-981E-F94EAA26597E}"/>
+                    </a:ext>
+                  </a:extLst>
+                </p:cNvPr>
+                <p:cNvPicPr>
+                  <a:picLocks noChangeAspect="1"/>
+                </p:cNvPicPr>
+                <p:nvPr/>
+              </p:nvPicPr>
+              <p:blipFill>
+                <a:blip r:embed="rId2">
+                  <a:extLst>
+                    <a:ext uri="{28A0092B-C50C-407E-A947-70E740481C1C}">
+                      <a14:useLocalDpi xmlns:a14="http://schemas.microsoft.com/office/drawing/2010/main" val="0"/>
+                    </a:ext>
+                  </a:extLst>
+                </a:blip>
+                <a:srcRect/>
+                <a:stretch/>
+              </p:blipFill>
+              <p:spPr>
+                <a:xfrm>
+                  <a:off x="609589" y="1142995"/>
+                  <a:ext cx="10972822" cy="4572009"/>
+                </a:xfrm>
+                <a:prstGeom prst="rect">
+                  <a:avLst/>
+                </a:prstGeom>
+              </p:spPr>
+            </p:pic>
+            <p:sp>
+              <p:nvSpPr>
+                <p:cNvPr id="14" name="Rectangle 13">
+                  <a:extLst>
+                    <a:ext uri="{FF2B5EF4-FFF2-40B4-BE49-F238E27FC236}">
+                      <a16:creationId xmlns:a16="http://schemas.microsoft.com/office/drawing/2014/main" id="{E25077FF-1A1C-4E6F-84BE-FF29D520B61F}"/>
+                    </a:ext>
+                  </a:extLst>
+                </p:cNvPr>
+                <p:cNvSpPr/>
+                <p:nvPr/>
+              </p:nvSpPr>
+              <p:spPr>
+                <a:xfrm>
+                  <a:off x="11080204" y="1737073"/>
+                  <a:ext cx="599893" cy="3977931"/>
+                </a:xfrm>
+                <a:prstGeom prst="rect">
+                  <a:avLst/>
+                </a:prstGeom>
+                <a:solidFill>
+                  <a:schemeClr val="bg1"/>
+                </a:solidFill>
+                <a:ln>
+                  <a:solidFill>
+                    <a:schemeClr val="bg1"/>
+                  </a:solidFill>
+                </a:ln>
+              </p:spPr>
+              <p:style>
+                <a:lnRef idx="2">
+                  <a:schemeClr val="accent1">
+                    <a:shade val="50000"/>
+                  </a:schemeClr>
+                </a:lnRef>
+                <a:fillRef idx="1">
+                  <a:schemeClr val="accent1"/>
+                </a:fillRef>
+                <a:effectRef idx="0">
+                  <a:schemeClr val="accent1"/>
+                </a:effectRef>
+                <a:fontRef idx="minor">
+                  <a:schemeClr val="lt1"/>
+                </a:fontRef>
+              </p:style>
+              <p:txBody>
+                <a:bodyPr rtlCol="0" anchor="ctr"/>
+                <a:lstStyle/>
+                <a:p>
+                  <a:pPr algn="ctr"/>
+                  <a:endParaRPr lang="en-US"/>
+                </a:p>
+              </p:txBody>
+            </p:sp>
+            <p:sp>
+              <p:nvSpPr>
+                <p:cNvPr id="7" name="TextBox 6">
+                  <a:extLst>
+                    <a:ext uri="{FF2B5EF4-FFF2-40B4-BE49-F238E27FC236}">
+                      <a16:creationId xmlns:a16="http://schemas.microsoft.com/office/drawing/2014/main" id="{A0C376A7-48A8-4271-9113-3477300838B9}"/>
+                    </a:ext>
+                  </a:extLst>
+                </p:cNvPr>
+                <p:cNvSpPr txBox="1"/>
+                <p:nvPr/>
+              </p:nvSpPr>
+              <p:spPr>
+                <a:xfrm>
+                  <a:off x="10742837" y="1735661"/>
+                  <a:ext cx="937261" cy="251902"/>
+                </a:xfrm>
+                <a:prstGeom prst="rect">
+                  <a:avLst/>
+                </a:prstGeom>
+                <a:solidFill>
+                  <a:schemeClr val="bg1"/>
+                </a:solidFill>
+              </p:spPr>
+              <p:txBody>
+                <a:bodyPr wrap="square" lIns="0">
+                  <a:spAutoFit/>
+                </a:bodyPr>
+                <a:lstStyle/>
+                <a:p>
+                  <a:r>
+                    <a:rPr lang="en-US" sz="1000" dirty="0">
+                      <a:latin typeface="Arial" panose="020B0604020202020204" pitchFamily="34" charset="0"/>
+                      <a:cs typeface="Arial" panose="020B0604020202020204" pitchFamily="34" charset="0"/>
+                    </a:rPr>
+                    <a:t>140,000,000</a:t>
+                  </a:r>
+                </a:p>
+              </p:txBody>
+            </p:sp>
+            <p:sp>
+              <p:nvSpPr>
+                <p:cNvPr id="9" name="TextBox 8">
+                  <a:extLst>
+                    <a:ext uri="{FF2B5EF4-FFF2-40B4-BE49-F238E27FC236}">
+                      <a16:creationId xmlns:a16="http://schemas.microsoft.com/office/drawing/2014/main" id="{0C1B7C7B-F5A4-43D7-9691-BF7A4D0768E8}"/>
+                    </a:ext>
+                  </a:extLst>
+                </p:cNvPr>
+                <p:cNvSpPr txBox="1"/>
+                <p:nvPr/>
+              </p:nvSpPr>
+              <p:spPr>
+                <a:xfrm>
+                  <a:off x="10742837" y="2819932"/>
+                  <a:ext cx="937261" cy="251902"/>
+                </a:xfrm>
+                <a:prstGeom prst="rect">
+                  <a:avLst/>
+                </a:prstGeom>
+                <a:solidFill>
+                  <a:schemeClr val="bg1"/>
+                </a:solidFill>
+              </p:spPr>
+              <p:txBody>
+                <a:bodyPr wrap="square" lIns="0">
+                  <a:spAutoFit/>
+                </a:bodyPr>
+                <a:lstStyle/>
+                <a:p>
+                  <a:r>
+                    <a:rPr lang="en-US" sz="1000" dirty="0">
+                      <a:latin typeface="Arial" panose="020B0604020202020204" pitchFamily="34" charset="0"/>
+                      <a:cs typeface="Arial" panose="020B0604020202020204" pitchFamily="34" charset="0"/>
+                    </a:rPr>
+                    <a:t>120,000,000</a:t>
+                  </a:r>
+                </a:p>
+              </p:txBody>
+            </p:sp>
+            <p:sp>
+              <p:nvSpPr>
+                <p:cNvPr id="11" name="TextBox 10">
+                  <a:extLst>
+                    <a:ext uri="{FF2B5EF4-FFF2-40B4-BE49-F238E27FC236}">
+                      <a16:creationId xmlns:a16="http://schemas.microsoft.com/office/drawing/2014/main" id="{4F21CB94-38C6-4833-84F2-3FFCF8FC3113}"/>
+                    </a:ext>
+                  </a:extLst>
+                </p:cNvPr>
+                <p:cNvSpPr txBox="1"/>
+                <p:nvPr/>
+              </p:nvSpPr>
+              <p:spPr>
+                <a:xfrm>
+                  <a:off x="10742836" y="3915851"/>
+                  <a:ext cx="937261" cy="251902"/>
+                </a:xfrm>
+                <a:prstGeom prst="rect">
+                  <a:avLst/>
+                </a:prstGeom>
+                <a:solidFill>
+                  <a:schemeClr val="bg1"/>
+                </a:solidFill>
+              </p:spPr>
+              <p:txBody>
+                <a:bodyPr wrap="square" lIns="0">
+                  <a:spAutoFit/>
+                </a:bodyPr>
+                <a:lstStyle/>
+                <a:p>
+                  <a:r>
+                    <a:rPr lang="en-US" sz="1000" dirty="0">
+                      <a:latin typeface="Arial" panose="020B0604020202020204" pitchFamily="34" charset="0"/>
+                      <a:cs typeface="Arial" panose="020B0604020202020204" pitchFamily="34" charset="0"/>
+                    </a:rPr>
+                    <a:t>100,000,000</a:t>
+                  </a:r>
+                </a:p>
+              </p:txBody>
+            </p:sp>
+            <p:sp>
+              <p:nvSpPr>
+                <p:cNvPr id="13" name="TextBox 12">
+                  <a:extLst>
+                    <a:ext uri="{FF2B5EF4-FFF2-40B4-BE49-F238E27FC236}">
+                      <a16:creationId xmlns:a16="http://schemas.microsoft.com/office/drawing/2014/main" id="{DCBC98DD-CE47-4BB4-8B5F-00A1B3C0E88C}"/>
+                    </a:ext>
+                  </a:extLst>
+                </p:cNvPr>
+                <p:cNvSpPr txBox="1"/>
+                <p:nvPr/>
+              </p:nvSpPr>
+              <p:spPr>
+                <a:xfrm>
+                  <a:off x="10742836" y="5017596"/>
+                  <a:ext cx="937261" cy="251902"/>
+                </a:xfrm>
+                <a:prstGeom prst="rect">
+                  <a:avLst/>
+                </a:prstGeom>
+                <a:solidFill>
+                  <a:schemeClr val="bg1"/>
+                </a:solidFill>
+              </p:spPr>
+              <p:txBody>
+                <a:bodyPr wrap="square" lIns="0">
+                  <a:spAutoFit/>
+                </a:bodyPr>
+                <a:lstStyle/>
+                <a:p>
+                  <a:r>
+                    <a:rPr lang="en-US" sz="1000" dirty="0">
+                      <a:latin typeface="Arial" panose="020B0604020202020204" pitchFamily="34" charset="0"/>
+                      <a:cs typeface="Arial" panose="020B0604020202020204" pitchFamily="34" charset="0"/>
+                    </a:rPr>
+                    <a:t>80,000,000</a:t>
+                  </a:r>
+                </a:p>
+              </p:txBody>
+            </p:sp>
+            <p:sp>
+              <p:nvSpPr>
+                <p:cNvPr id="15" name="TextBox 14">
+                  <a:extLst>
+                    <a:ext uri="{FF2B5EF4-FFF2-40B4-BE49-F238E27FC236}">
+                      <a16:creationId xmlns:a16="http://schemas.microsoft.com/office/drawing/2014/main" id="{91D3AB36-A2AB-4C0F-B24D-A54930F414A4}"/>
+                    </a:ext>
+                  </a:extLst>
+                </p:cNvPr>
+                <p:cNvSpPr txBox="1"/>
+                <p:nvPr/>
+              </p:nvSpPr>
+              <p:spPr>
+                <a:xfrm rot="5400000">
+                  <a:off x="10185820" y="3390458"/>
+                  <a:ext cx="2890869" cy="276999"/>
+                </a:xfrm>
+                <a:prstGeom prst="rect">
+                  <a:avLst/>
+                </a:prstGeom>
+                <a:noFill/>
+              </p:spPr>
+              <p:txBody>
+                <a:bodyPr wrap="square" rtlCol="0">
+                  <a:spAutoFit/>
+                </a:bodyPr>
+                <a:lstStyle/>
+                <a:p>
+                  <a:r>
+                    <a:rPr lang="en-US" sz="1200" dirty="0">
+                      <a:latin typeface="Arial" panose="020B0604020202020204" pitchFamily="34" charset="0"/>
+                      <a:cs typeface="Arial" panose="020B0604020202020204" pitchFamily="34" charset="0"/>
+                    </a:rPr>
+                    <a:t>Number of Twitter Timeline Deliveries</a:t>
+                  </a:r>
+                </a:p>
+              </p:txBody>
+            </p:sp>
+          </p:grpSp>
+          <p:sp>
+            <p:nvSpPr>
+              <p:cNvPr id="17" name="Rectangle 16">
+                <a:extLst>
+                  <a:ext uri="{FF2B5EF4-FFF2-40B4-BE49-F238E27FC236}">
+                    <a16:creationId xmlns:a16="http://schemas.microsoft.com/office/drawing/2014/main" id="{B8108AFD-C607-4C34-A0A0-2DEC1FB88376}"/>
+                  </a:ext>
+                </a:extLst>
+              </p:cNvPr>
+              <p:cNvSpPr/>
+              <p:nvPr/>
+            </p:nvSpPr>
+            <p:spPr>
+              <a:xfrm>
+                <a:off x="9157444" y="4775781"/>
+                <a:ext cx="118333" cy="118335"/>
+              </a:xfrm>
+              <a:prstGeom prst="rect">
+                <a:avLst/>
+              </a:prstGeom>
+            </p:spPr>
+            <p:style>
+              <a:lnRef idx="2">
+                <a:schemeClr val="dk1">
+                  <a:shade val="50000"/>
+                </a:schemeClr>
+              </a:lnRef>
+              <a:fillRef idx="1">
+                <a:schemeClr val="dk1"/>
+              </a:fillRef>
+              <a:effectRef idx="0">
+                <a:schemeClr val="dk1"/>
+              </a:effectRef>
+              <a:fontRef idx="minor">
+                <a:schemeClr val="lt1"/>
+              </a:fontRef>
+            </p:style>
+            <p:txBody>
+              <a:bodyPr rtlCol="0" anchor="ctr"/>
+              <a:lstStyle/>
+              <a:p>
+                <a:pPr algn="ctr"/>
+                <a:endParaRPr lang="en-US"/>
+              </a:p>
+            </p:txBody>
+          </p:sp>
+          <p:sp>
+            <p:nvSpPr>
+              <p:cNvPr id="18" name="Isosceles Triangle 17">
+                <a:extLst>
+                  <a:ext uri="{FF2B5EF4-FFF2-40B4-BE49-F238E27FC236}">
+                    <a16:creationId xmlns:a16="http://schemas.microsoft.com/office/drawing/2014/main" id="{E3F61458-7507-44FE-88EA-FCE030BDCA13}"/>
+                  </a:ext>
+                </a:extLst>
+              </p:cNvPr>
+              <p:cNvSpPr/>
+              <p:nvPr/>
+            </p:nvSpPr>
+            <p:spPr>
+              <a:xfrm>
+                <a:off x="9138617" y="4974392"/>
+                <a:ext cx="150607" cy="118335"/>
+              </a:xfrm>
+              <a:prstGeom prst="triangle">
+                <a:avLst/>
+              </a:prstGeom>
+              <a:solidFill>
+                <a:schemeClr val="bg1"/>
+              </a:solidFill>
+              <a:ln>
+                <a:solidFill>
+                  <a:schemeClr val="tx1"/>
+                </a:solidFill>
+              </a:ln>
+            </p:spPr>
+            <p:style>
+              <a:lnRef idx="2">
+                <a:schemeClr val="accent1">
+                  <a:shade val="50000"/>
+                </a:schemeClr>
+              </a:lnRef>
+              <a:fillRef idx="1">
+                <a:schemeClr val="accent1"/>
+              </a:fillRef>
+              <a:effectRef idx="0">
+                <a:schemeClr val="accent1"/>
+              </a:effectRef>
+              <a:fontRef idx="minor">
+                <a:schemeClr val="lt1"/>
+              </a:fontRef>
+            </p:style>
+            <p:txBody>
+              <a:bodyPr rtlCol="0" anchor="ctr"/>
+              <a:lstStyle/>
+              <a:p>
+                <a:pPr algn="ctr"/>
+                <a:endParaRPr lang="en-US"/>
+              </a:p>
+            </p:txBody>
+          </p:sp>
+          <p:sp>
+            <p:nvSpPr>
+              <p:cNvPr id="19" name="TextBox 18">
+                <a:extLst>
+                  <a:ext uri="{FF2B5EF4-FFF2-40B4-BE49-F238E27FC236}">
+                    <a16:creationId xmlns:a16="http://schemas.microsoft.com/office/drawing/2014/main" id="{FF0090FE-605E-4620-8C22-06ED5361E459}"/>
+                  </a:ext>
+                </a:extLst>
+              </p:cNvPr>
+              <p:cNvSpPr txBox="1"/>
+              <p:nvPr/>
+            </p:nvSpPr>
+            <p:spPr>
+              <a:xfrm>
+                <a:off x="9318810" y="4704454"/>
+                <a:ext cx="1394440" cy="469359"/>
+              </a:xfrm>
+              <a:prstGeom prst="rect">
+                <a:avLst/>
+              </a:prstGeom>
+              <a:noFill/>
+            </p:spPr>
+            <p:txBody>
+              <a:bodyPr wrap="square" rtlCol="0">
+                <a:spAutoFit/>
+              </a:bodyPr>
+              <a:lstStyle/>
+              <a:p>
+                <a:r>
+                  <a:rPr lang="en-US" sz="1000" dirty="0">
+                    <a:latin typeface="Arial" panose="020B0604020202020204" pitchFamily="34" charset="0"/>
+                    <a:cs typeface="Arial" panose="020B0604020202020204" pitchFamily="34" charset="0"/>
+                  </a:rPr>
+                  <a:t>Hashtag</a:t>
+                </a:r>
+              </a:p>
+              <a:p>
+                <a:endParaRPr lang="en-US" sz="400" dirty="0">
+                  <a:latin typeface="Arial" panose="020B0604020202020204" pitchFamily="34" charset="0"/>
+                  <a:cs typeface="Arial" panose="020B0604020202020204" pitchFamily="34" charset="0"/>
+                </a:endParaRPr>
+              </a:p>
+              <a:p>
+                <a:r>
+                  <a:rPr lang="en-US" sz="1000" dirty="0">
+                    <a:latin typeface="Arial" panose="020B0604020202020204" pitchFamily="34" charset="0"/>
+                    <a:cs typeface="Arial" panose="020B0604020202020204" pitchFamily="34" charset="0"/>
+                  </a:rPr>
+                  <a:t>Timeline Delivery</a:t>
+                </a:r>
+              </a:p>
+            </p:txBody>
+          </p:sp>
+        </p:grpSp>
+      </p:grpSp>
+    </p:spTree>
+    <p:extLst>
+      <p:ext uri="{BB962C8B-B14F-4D97-AF65-F5344CB8AC3E}">
+        <p14:creationId xmlns:p14="http://schemas.microsoft.com/office/powerpoint/2010/main" val="3295037365"/>
+      </p:ext>
+    </p:extLst>
+  </p:cSld>
+  <p:clrMapOvr>
+    <a:masterClrMapping/>
+  </p:clrMapOvr>
+</p:sld>
+</file>
+
 <file path=ppt/theme/theme1.xml><?xml version="1.0" encoding="utf-8"?>
 <a:theme xmlns:a="http://schemas.openxmlformats.org/drawingml/2006/main" name="Office Theme">
   <a:themeElements>

</xml_diff>